<commit_message>
Revised second "original migration figure" from Matt's intern final presentation.
</commit_message>
<xml_diff>
--- a/migration-original-figures.pptx
+++ b/migration-original-figures.pptx
@@ -4,9 +4,12 @@
   <p:sldMasterIdLst>
     <p:sldMasterId id="2147483648" r:id="rId1"/>
   </p:sldMasterIdLst>
+  <p:notesMasterIdLst>
+    <p:notesMasterId r:id="rId4"/>
+  </p:notesMasterIdLst>
   <p:sldIdLst>
     <p:sldId id="257" r:id="rId2"/>
-    <p:sldId id="258" r:id="rId3"/>
+    <p:sldId id="259" r:id="rId3"/>
   </p:sldIdLst>
   <p:sldSz cx="12192000" cy="6858000"/>
   <p:notesSz cx="6858000" cy="9144000"/>
@@ -105,7 +108,669 @@
       </a:defRPr>
     </a:lvl9pPr>
   </p:defaultTextStyle>
+  <p:extLst>
+    <p:ext uri="{EFAFB233-063F-42B5-8137-9DF3F51BA10A}">
+      <p15:sldGuideLst xmlns:p15="http://schemas.microsoft.com/office/powerpoint/2012/main"/>
+    </p:ext>
+  </p:extLst>
 </p:presentation>
+</file>
+
+<file path=ppt/notesMasters/notesMaster1.xml><?xml version="1.0" encoding="utf-8"?>
+<p:notesMaster xmlns:a="http://schemas.openxmlformats.org/drawingml/2006/main" xmlns:r="http://schemas.openxmlformats.org/officeDocument/2006/relationships" xmlns:p="http://schemas.openxmlformats.org/presentationml/2006/main">
+  <p:cSld>
+    <p:bg>
+      <p:bgRef idx="1001">
+        <a:schemeClr val="bg1"/>
+      </p:bgRef>
+    </p:bg>
+    <p:spTree>
+      <p:nvGrpSpPr>
+        <p:cNvPr id="1" name=""/>
+        <p:cNvGrpSpPr/>
+        <p:nvPr/>
+      </p:nvGrpSpPr>
+      <p:grpSpPr>
+        <a:xfrm>
+          <a:off x="0" y="0"/>
+          <a:ext cx="0" cy="0"/>
+          <a:chOff x="0" y="0"/>
+          <a:chExt cx="0" cy="0"/>
+        </a:xfrm>
+      </p:grpSpPr>
+      <p:sp>
+        <p:nvSpPr>
+          <p:cNvPr id="2" name="Header Placeholder 1"/>
+          <p:cNvSpPr>
+            <a:spLocks noGrp="1"/>
+          </p:cNvSpPr>
+          <p:nvPr>
+            <p:ph type="hdr" sz="quarter"/>
+          </p:nvPr>
+        </p:nvSpPr>
+        <p:spPr>
+          <a:xfrm>
+            <a:off x="0" y="0"/>
+            <a:ext cx="2971800" cy="458788"/>
+          </a:xfrm>
+          <a:prstGeom prst="rect">
+            <a:avLst/>
+          </a:prstGeom>
+        </p:spPr>
+        <p:txBody>
+          <a:bodyPr vert="horz" lIns="91440" tIns="45720" rIns="91440" bIns="45720" rtlCol="0"/>
+          <a:lstStyle>
+            <a:lvl1pPr algn="l">
+              <a:defRPr sz="1200"/>
+            </a:lvl1pPr>
+          </a:lstStyle>
+          <a:p>
+            <a:endParaRPr lang="en-US"/>
+          </a:p>
+        </p:txBody>
+      </p:sp>
+      <p:sp>
+        <p:nvSpPr>
+          <p:cNvPr id="3" name="Date Placeholder 2"/>
+          <p:cNvSpPr>
+            <a:spLocks noGrp="1"/>
+          </p:cNvSpPr>
+          <p:nvPr>
+            <p:ph type="dt" idx="1"/>
+          </p:nvPr>
+        </p:nvSpPr>
+        <p:spPr>
+          <a:xfrm>
+            <a:off x="3884613" y="0"/>
+            <a:ext cx="2971800" cy="458788"/>
+          </a:xfrm>
+          <a:prstGeom prst="rect">
+            <a:avLst/>
+          </a:prstGeom>
+        </p:spPr>
+        <p:txBody>
+          <a:bodyPr vert="horz" lIns="91440" tIns="45720" rIns="91440" bIns="45720" rtlCol="0"/>
+          <a:lstStyle>
+            <a:lvl1pPr algn="r">
+              <a:defRPr sz="1200"/>
+            </a:lvl1pPr>
+          </a:lstStyle>
+          <a:p>
+            <a:fld id="{02EC02CE-2B70-4C72-A34B-3B1BCD8CCD30}" type="datetimeFigureOut">
+              <a:rPr lang="en-US" smtClean="0"/>
+              <a:t>2015-08-20</a:t>
+            </a:fld>
+            <a:endParaRPr lang="en-US"/>
+          </a:p>
+        </p:txBody>
+      </p:sp>
+      <p:sp>
+        <p:nvSpPr>
+          <p:cNvPr id="4" name="Slide Image Placeholder 3"/>
+          <p:cNvSpPr>
+            <a:spLocks noGrp="1" noRot="1" noChangeAspect="1"/>
+          </p:cNvSpPr>
+          <p:nvPr>
+            <p:ph type="sldImg" idx="2"/>
+          </p:nvPr>
+        </p:nvSpPr>
+        <p:spPr>
+          <a:xfrm>
+            <a:off x="685800" y="1143000"/>
+            <a:ext cx="5486400" cy="3086100"/>
+          </a:xfrm>
+          <a:prstGeom prst="rect">
+            <a:avLst/>
+          </a:prstGeom>
+          <a:noFill/>
+          <a:ln w="12700">
+            <a:solidFill>
+              <a:prstClr val="black"/>
+            </a:solidFill>
+          </a:ln>
+        </p:spPr>
+        <p:txBody>
+          <a:bodyPr vert="horz" lIns="91440" tIns="45720" rIns="91440" bIns="45720" rtlCol="0" anchor="ctr"/>
+          <a:lstStyle/>
+          <a:p>
+            <a:endParaRPr lang="en-US"/>
+          </a:p>
+        </p:txBody>
+      </p:sp>
+      <p:sp>
+        <p:nvSpPr>
+          <p:cNvPr id="5" name="Notes Placeholder 4"/>
+          <p:cNvSpPr>
+            <a:spLocks noGrp="1"/>
+          </p:cNvSpPr>
+          <p:nvPr>
+            <p:ph type="body" sz="quarter" idx="3"/>
+          </p:nvPr>
+        </p:nvSpPr>
+        <p:spPr>
+          <a:xfrm>
+            <a:off x="685800" y="4400550"/>
+            <a:ext cx="5486400" cy="3600450"/>
+          </a:xfrm>
+          <a:prstGeom prst="rect">
+            <a:avLst/>
+          </a:prstGeom>
+        </p:spPr>
+        <p:txBody>
+          <a:bodyPr vert="horz" lIns="91440" tIns="45720" rIns="91440" bIns="45720" rtlCol="0"/>
+          <a:lstStyle/>
+          <a:p>
+            <a:pPr lvl="0"/>
+            <a:r>
+              <a:rPr lang="en-US" smtClean="0"/>
+              <a:t>Click to edit Master text styles</a:t>
+            </a:r>
+          </a:p>
+          <a:p>
+            <a:pPr lvl="1"/>
+            <a:r>
+              <a:rPr lang="en-US" smtClean="0"/>
+              <a:t>Second level</a:t>
+            </a:r>
+          </a:p>
+          <a:p>
+            <a:pPr lvl="2"/>
+            <a:r>
+              <a:rPr lang="en-US" smtClean="0"/>
+              <a:t>Third level</a:t>
+            </a:r>
+          </a:p>
+          <a:p>
+            <a:pPr lvl="3"/>
+            <a:r>
+              <a:rPr lang="en-US" smtClean="0"/>
+              <a:t>Fourth level</a:t>
+            </a:r>
+          </a:p>
+          <a:p>
+            <a:pPr lvl="4"/>
+            <a:r>
+              <a:rPr lang="en-US" smtClean="0"/>
+              <a:t>Fifth level</a:t>
+            </a:r>
+            <a:endParaRPr lang="en-US"/>
+          </a:p>
+        </p:txBody>
+      </p:sp>
+      <p:sp>
+        <p:nvSpPr>
+          <p:cNvPr id="6" name="Footer Placeholder 5"/>
+          <p:cNvSpPr>
+            <a:spLocks noGrp="1"/>
+          </p:cNvSpPr>
+          <p:nvPr>
+            <p:ph type="ftr" sz="quarter" idx="4"/>
+          </p:nvPr>
+        </p:nvSpPr>
+        <p:spPr>
+          <a:xfrm>
+            <a:off x="0" y="8685213"/>
+            <a:ext cx="2971800" cy="458787"/>
+          </a:xfrm>
+          <a:prstGeom prst="rect">
+            <a:avLst/>
+          </a:prstGeom>
+        </p:spPr>
+        <p:txBody>
+          <a:bodyPr vert="horz" lIns="91440" tIns="45720" rIns="91440" bIns="45720" rtlCol="0" anchor="b"/>
+          <a:lstStyle>
+            <a:lvl1pPr algn="l">
+              <a:defRPr sz="1200"/>
+            </a:lvl1pPr>
+          </a:lstStyle>
+          <a:p>
+            <a:endParaRPr lang="en-US"/>
+          </a:p>
+        </p:txBody>
+      </p:sp>
+      <p:sp>
+        <p:nvSpPr>
+          <p:cNvPr id="7" name="Slide Number Placeholder 6"/>
+          <p:cNvSpPr>
+            <a:spLocks noGrp="1"/>
+          </p:cNvSpPr>
+          <p:nvPr>
+            <p:ph type="sldNum" sz="quarter" idx="5"/>
+          </p:nvPr>
+        </p:nvSpPr>
+        <p:spPr>
+          <a:xfrm>
+            <a:off x="3884613" y="8685213"/>
+            <a:ext cx="2971800" cy="458787"/>
+          </a:xfrm>
+          <a:prstGeom prst="rect">
+            <a:avLst/>
+          </a:prstGeom>
+        </p:spPr>
+        <p:txBody>
+          <a:bodyPr vert="horz" lIns="91440" tIns="45720" rIns="91440" bIns="45720" rtlCol="0" anchor="b"/>
+          <a:lstStyle>
+            <a:lvl1pPr algn="r">
+              <a:defRPr sz="1200"/>
+            </a:lvl1pPr>
+          </a:lstStyle>
+          <a:p>
+            <a:fld id="{C6A6B1E2-9909-432B-BDE4-2E7D25690776}" type="slidenum">
+              <a:rPr lang="en-US" smtClean="0"/>
+              <a:t>‹#›</a:t>
+            </a:fld>
+            <a:endParaRPr lang="en-US"/>
+          </a:p>
+        </p:txBody>
+      </p:sp>
+    </p:spTree>
+    <p:extLst>
+      <p:ext uri="{BB962C8B-B14F-4D97-AF65-F5344CB8AC3E}">
+        <p14:creationId xmlns:p14="http://schemas.microsoft.com/office/powerpoint/2010/main" val="109043957"/>
+      </p:ext>
+    </p:extLst>
+  </p:cSld>
+  <p:clrMap bg1="lt1" tx1="dk1" bg2="lt2" tx2="dk2" accent1="accent1" accent2="accent2" accent3="accent3" accent4="accent4" accent5="accent5" accent6="accent6" hlink="hlink" folHlink="folHlink"/>
+  <p:notesStyle>
+    <a:lvl1pPr marL="0" algn="l" defTabSz="914400" rtl="0" eaLnBrk="1" latinLnBrk="0" hangingPunct="1">
+      <a:defRPr sz="1200" kern="1200">
+        <a:solidFill>
+          <a:schemeClr val="tx1"/>
+        </a:solidFill>
+        <a:latin typeface="+mn-lt"/>
+        <a:ea typeface="+mn-ea"/>
+        <a:cs typeface="+mn-cs"/>
+      </a:defRPr>
+    </a:lvl1pPr>
+    <a:lvl2pPr marL="457200" algn="l" defTabSz="914400" rtl="0" eaLnBrk="1" latinLnBrk="0" hangingPunct="1">
+      <a:defRPr sz="1200" kern="1200">
+        <a:solidFill>
+          <a:schemeClr val="tx1"/>
+        </a:solidFill>
+        <a:latin typeface="+mn-lt"/>
+        <a:ea typeface="+mn-ea"/>
+        <a:cs typeface="+mn-cs"/>
+      </a:defRPr>
+    </a:lvl2pPr>
+    <a:lvl3pPr marL="914400" algn="l" defTabSz="914400" rtl="0" eaLnBrk="1" latinLnBrk="0" hangingPunct="1">
+      <a:defRPr sz="1200" kern="1200">
+        <a:solidFill>
+          <a:schemeClr val="tx1"/>
+        </a:solidFill>
+        <a:latin typeface="+mn-lt"/>
+        <a:ea typeface="+mn-ea"/>
+        <a:cs typeface="+mn-cs"/>
+      </a:defRPr>
+    </a:lvl3pPr>
+    <a:lvl4pPr marL="1371600" algn="l" defTabSz="914400" rtl="0" eaLnBrk="1" latinLnBrk="0" hangingPunct="1">
+      <a:defRPr sz="1200" kern="1200">
+        <a:solidFill>
+          <a:schemeClr val="tx1"/>
+        </a:solidFill>
+        <a:latin typeface="+mn-lt"/>
+        <a:ea typeface="+mn-ea"/>
+        <a:cs typeface="+mn-cs"/>
+      </a:defRPr>
+    </a:lvl4pPr>
+    <a:lvl5pPr marL="1828800" algn="l" defTabSz="914400" rtl="0" eaLnBrk="1" latinLnBrk="0" hangingPunct="1">
+      <a:defRPr sz="1200" kern="1200">
+        <a:solidFill>
+          <a:schemeClr val="tx1"/>
+        </a:solidFill>
+        <a:latin typeface="+mn-lt"/>
+        <a:ea typeface="+mn-ea"/>
+        <a:cs typeface="+mn-cs"/>
+      </a:defRPr>
+    </a:lvl5pPr>
+    <a:lvl6pPr marL="2286000" algn="l" defTabSz="914400" rtl="0" eaLnBrk="1" latinLnBrk="0" hangingPunct="1">
+      <a:defRPr sz="1200" kern="1200">
+        <a:solidFill>
+          <a:schemeClr val="tx1"/>
+        </a:solidFill>
+        <a:latin typeface="+mn-lt"/>
+        <a:ea typeface="+mn-ea"/>
+        <a:cs typeface="+mn-cs"/>
+      </a:defRPr>
+    </a:lvl6pPr>
+    <a:lvl7pPr marL="2743200" algn="l" defTabSz="914400" rtl="0" eaLnBrk="1" latinLnBrk="0" hangingPunct="1">
+      <a:defRPr sz="1200" kern="1200">
+        <a:solidFill>
+          <a:schemeClr val="tx1"/>
+        </a:solidFill>
+        <a:latin typeface="+mn-lt"/>
+        <a:ea typeface="+mn-ea"/>
+        <a:cs typeface="+mn-cs"/>
+      </a:defRPr>
+    </a:lvl7pPr>
+    <a:lvl8pPr marL="3200400" algn="l" defTabSz="914400" rtl="0" eaLnBrk="1" latinLnBrk="0" hangingPunct="1">
+      <a:defRPr sz="1200" kern="1200">
+        <a:solidFill>
+          <a:schemeClr val="tx1"/>
+        </a:solidFill>
+        <a:latin typeface="+mn-lt"/>
+        <a:ea typeface="+mn-ea"/>
+        <a:cs typeface="+mn-cs"/>
+      </a:defRPr>
+    </a:lvl8pPr>
+    <a:lvl9pPr marL="3657600" algn="l" defTabSz="914400" rtl="0" eaLnBrk="1" latinLnBrk="0" hangingPunct="1">
+      <a:defRPr sz="1200" kern="1200">
+        <a:solidFill>
+          <a:schemeClr val="tx1"/>
+        </a:solidFill>
+        <a:latin typeface="+mn-lt"/>
+        <a:ea typeface="+mn-ea"/>
+        <a:cs typeface="+mn-cs"/>
+      </a:defRPr>
+    </a:lvl9pPr>
+  </p:notesStyle>
+</p:notesMaster>
+</file>
+
+<file path=ppt/notesSlides/notesSlide1.xml><?xml version="1.0" encoding="utf-8"?>
+<p:notes xmlns:a="http://schemas.openxmlformats.org/drawingml/2006/main" xmlns:r="http://schemas.openxmlformats.org/officeDocument/2006/relationships" xmlns:p="http://schemas.openxmlformats.org/presentationml/2006/main">
+  <p:cSld>
+    <p:spTree>
+      <p:nvGrpSpPr>
+        <p:cNvPr id="1" name=""/>
+        <p:cNvGrpSpPr/>
+        <p:nvPr/>
+      </p:nvGrpSpPr>
+      <p:grpSpPr>
+        <a:xfrm>
+          <a:off x="0" y="0"/>
+          <a:ext cx="0" cy="0"/>
+          <a:chOff x="0" y="0"/>
+          <a:chExt cx="0" cy="0"/>
+        </a:xfrm>
+      </p:grpSpPr>
+      <p:sp>
+        <p:nvSpPr>
+          <p:cNvPr id="2" name="Slide Image Placeholder 1"/>
+          <p:cNvSpPr>
+            <a:spLocks noGrp="1" noRot="1" noChangeAspect="1"/>
+          </p:cNvSpPr>
+          <p:nvPr>
+            <p:ph type="sldImg"/>
+          </p:nvPr>
+        </p:nvSpPr>
+        <p:spPr/>
+      </p:sp>
+      <p:sp>
+        <p:nvSpPr>
+          <p:cNvPr id="3" name="Notes Placeholder 2"/>
+          <p:cNvSpPr>
+            <a:spLocks noGrp="1"/>
+          </p:cNvSpPr>
+          <p:nvPr>
+            <p:ph type="body" idx="1"/>
+          </p:nvPr>
+        </p:nvSpPr>
+        <p:spPr/>
+        <p:txBody>
+          <a:bodyPr/>
+          <a:lstStyle/>
+          <a:p>
+            <a:r>
+              <a:rPr lang="en-US" dirty="0" smtClean="0"/>
+              <a:t>Talk through the figure.</a:t>
+            </a:r>
+          </a:p>
+          <a:p>
+            <a:endParaRPr lang="en-US" baseline="0" dirty="0" smtClean="0"/>
+          </a:p>
+          <a:p>
+            <a:r>
+              <a:rPr lang="en-US" baseline="0" dirty="0" smtClean="0"/>
+              <a:t>More details (pasted from draft paper for the benefit of anyone reading these slides later, since I don’t know when that paper will become available to all Microsoft):</a:t>
+            </a:r>
+          </a:p>
+          <a:p>
+            <a:endParaRPr lang="en-US" baseline="0" dirty="0" smtClean="0"/>
+          </a:p>
+          <a:p>
+            <a:r>
+              <a:rPr lang="en-US" baseline="0" dirty="0" smtClean="0"/>
+              <a:t>% N.B. </a:t>
+            </a:r>
+            <a:r>
+              <a:rPr lang="en-US" baseline="0" dirty="0" err="1" smtClean="0"/>
+              <a:t>SpecTable</a:t>
+            </a:r>
+            <a:r>
+              <a:rPr lang="en-US" baseline="0" dirty="0" smtClean="0"/>
+              <a:t> = </a:t>
+            </a:r>
+            <a:r>
+              <a:rPr lang="en-US" baseline="0" dirty="0" err="1" smtClean="0"/>
+              <a:t>InMemoryTableWithHistory</a:t>
+            </a:r>
+            <a:r>
+              <a:rPr lang="en-US" baseline="0" dirty="0" smtClean="0"/>
+              <a:t> in the current codebase. ~ Matt 2015-08-17</a:t>
+            </a:r>
+          </a:p>
+          <a:p>
+            <a:r>
+              <a:rPr lang="en-US" baseline="0" dirty="0" smtClean="0"/>
+              <a:t>Since the specification is deterministic under sequential calls except for the results of multi-page reads, we decided the easiest way to formulate it for automated testing was to write an in-memory reference implementation called </a:t>
+            </a:r>
+            <a:r>
+              <a:rPr lang="en-US" baseline="0" dirty="0" err="1" smtClean="0"/>
+              <a:t>SpecTable</a:t>
+            </a:r>
+            <a:r>
+              <a:rPr lang="en-US" baseline="0" dirty="0" smtClean="0"/>
+              <a:t>.  Given a multi-page read, </a:t>
+            </a:r>
+            <a:r>
+              <a:rPr lang="en-US" baseline="0" dirty="0" err="1" smtClean="0"/>
+              <a:t>SpecTable</a:t>
+            </a:r>
+            <a:r>
+              <a:rPr lang="en-US" baseline="0" dirty="0" smtClean="0"/>
+              <a:t> can actually produce a list of all valid results.  Our correctness property is then:</a:t>
+            </a:r>
+          </a:p>
+          <a:p>
+            <a:r>
+              <a:rPr lang="en-US" baseline="0" dirty="0" smtClean="0"/>
+              <a:t>\begin{quote}</a:t>
+            </a:r>
+          </a:p>
+          <a:p>
+            <a:r>
+              <a:rPr lang="en-US" baseline="0" dirty="0" smtClean="0"/>
+              <a:t>For every execution trace of a collection of </a:t>
+            </a:r>
+            <a:r>
+              <a:rPr lang="en-US" baseline="0" dirty="0" err="1" smtClean="0"/>
+              <a:t>MigratingTables</a:t>
+            </a:r>
+            <a:r>
+              <a:rPr lang="en-US" baseline="0" dirty="0" smtClean="0"/>
+              <a:t> backed by the same pair of </a:t>
+            </a:r>
+            <a:r>
+              <a:rPr lang="en-US" baseline="0" dirty="0" err="1" smtClean="0"/>
+              <a:t>SpecTables</a:t>
+            </a:r>
+            <a:r>
+              <a:rPr lang="en-US" baseline="0" dirty="0" smtClean="0"/>
+              <a:t> (which </a:t>
+            </a:r>
+            <a:r>
+              <a:rPr lang="en-US" baseline="0" dirty="0" err="1" smtClean="0"/>
+              <a:t>nondeterministically</a:t>
+            </a:r>
+            <a:r>
+              <a:rPr lang="en-US" baseline="0" dirty="0" smtClean="0"/>
+              <a:t> choose one of the valid results for each multi-page read), there exists a linearization of the combined input history such that the output in the original trace matches the output of a ``reference'' </a:t>
+            </a:r>
+            <a:r>
+              <a:rPr lang="en-US" baseline="0" dirty="0" err="1" smtClean="0"/>
+              <a:t>SpecTable</a:t>
+            </a:r>
+            <a:r>
+              <a:rPr lang="en-US" baseline="0" dirty="0" smtClean="0"/>
+              <a:t> on the linearized input.</a:t>
+            </a:r>
+          </a:p>
+          <a:p>
+            <a:r>
+              <a:rPr lang="en-US" baseline="0" dirty="0" smtClean="0"/>
+              <a:t>\end{quote}</a:t>
+            </a:r>
+          </a:p>
+          <a:p>
+            <a:endParaRPr lang="en-US" baseline="0" dirty="0" smtClean="0"/>
+          </a:p>
+          <a:p>
+            <a:r>
+              <a:rPr lang="en-US" baseline="0" dirty="0" smtClean="0"/>
+              <a:t>We instrumented </a:t>
+            </a:r>
+            <a:r>
+              <a:rPr lang="en-US" baseline="0" dirty="0" err="1" smtClean="0"/>
+              <a:t>MigratingTable</a:t>
+            </a:r>
+            <a:r>
+              <a:rPr lang="en-US" baseline="0" dirty="0" smtClean="0"/>
+              <a:t> to report the \term{linearization point} of each input call, which in our case is always one of the corresponding \term{backend calls} to the backend tables (often the last).  Specifically, after each backend call completes, </a:t>
+            </a:r>
+            <a:r>
+              <a:rPr lang="en-US" baseline="0" dirty="0" err="1" smtClean="0"/>
+              <a:t>MigratingTable</a:t>
+            </a:r>
+            <a:r>
+              <a:rPr lang="en-US" baseline="0" dirty="0" smtClean="0"/>
+              <a:t> reports whether it was the linearization point, which may depend on the result of the call.  This makes it possible to verify the correctness property as the system executes.  We have a \</a:t>
+            </a:r>
+            <a:r>
+              <a:rPr lang="en-US" baseline="0" dirty="0" err="1" smtClean="0"/>
+              <a:t>psharp</a:t>
+            </a:r>
+            <a:r>
+              <a:rPr lang="en-US" baseline="0" dirty="0" smtClean="0"/>
+              <a:t> \term{tables machine} containing all three </a:t>
+            </a:r>
+            <a:r>
+              <a:rPr lang="en-US" baseline="0" dirty="0" err="1" smtClean="0"/>
+              <a:t>SpecTables</a:t>
+            </a:r>
+            <a:r>
+              <a:rPr lang="en-US" baseline="0" dirty="0" smtClean="0"/>
+              <a:t> and a collection of \term{service machines} each containing a </a:t>
+            </a:r>
+            <a:r>
+              <a:rPr lang="en-US" baseline="0" dirty="0" err="1" smtClean="0"/>
+              <a:t>MigratingTable</a:t>
+            </a:r>
+            <a:r>
+              <a:rPr lang="en-US" baseline="0" dirty="0" smtClean="0"/>
+              <a:t>.  Each service machine issues a random sequence of input calls to its </a:t>
+            </a:r>
+            <a:r>
+              <a:rPr lang="en-US" baseline="0" dirty="0" err="1" smtClean="0"/>
+              <a:t>MigratingTable</a:t>
+            </a:r>
+            <a:r>
+              <a:rPr lang="en-US" baseline="0" dirty="0" smtClean="0"/>
+              <a:t>, which sends backend calls to the tables machine.  When </a:t>
+            </a:r>
+            <a:r>
+              <a:rPr lang="en-US" baseline="0" dirty="0" err="1" smtClean="0"/>
+              <a:t>MigratingTable</a:t>
+            </a:r>
+            <a:r>
+              <a:rPr lang="en-US" baseline="0" dirty="0" smtClean="0"/>
+              <a:t> reports the linearization point of an input call, the service machine sends that input call to the reference table.  When an input call completes, the service machine checks that the results from the </a:t>
+            </a:r>
+            <a:r>
+              <a:rPr lang="en-US" baseline="0" dirty="0" err="1" smtClean="0"/>
+              <a:t>MigratingTable</a:t>
+            </a:r>
+            <a:r>
+              <a:rPr lang="en-US" baseline="0" dirty="0" smtClean="0"/>
+              <a:t> and the reference table agree.  \</a:t>
+            </a:r>
+            <a:r>
+              <a:rPr lang="en-US" baseline="0" dirty="0" err="1" smtClean="0"/>
+              <a:t>psharp</a:t>
+            </a:r>
+            <a:r>
+              <a:rPr lang="en-US" baseline="0" dirty="0" smtClean="0"/>
+              <a:t> controls the interleaving of the backend calls.  To ensure that the reference table is never observed to be out of sync with the backend tables, after the tables machine processes a backend call, it enters a state that defers further backend calls until </a:t>
+            </a:r>
+            <a:r>
+              <a:rPr lang="en-US" baseline="0" dirty="0" err="1" smtClean="0"/>
+              <a:t>MigratingTable</a:t>
+            </a:r>
+            <a:r>
+              <a:rPr lang="en-US" baseline="0" dirty="0" smtClean="0"/>
+              <a:t> has reported whether the backend call was a linearization point and (if so) the call to the reference table has been made.  We use the \</a:t>
+            </a:r>
+            <a:r>
+              <a:rPr lang="en-US" baseline="0" dirty="0" err="1" smtClean="0"/>
+              <a:t>psharp</a:t>
+            </a:r>
+            <a:r>
+              <a:rPr lang="en-US" baseline="0" dirty="0" smtClean="0"/>
+              <a:t> nondeterminism API to generate the input calls, so in principle an exhaustive \</a:t>
+            </a:r>
+            <a:r>
+              <a:rPr lang="en-US" baseline="0" dirty="0" err="1" smtClean="0"/>
+              <a:t>psharp</a:t>
+            </a:r>
+            <a:r>
+              <a:rPr lang="en-US" baseline="0" dirty="0" smtClean="0"/>
+              <a:t> behavior exploration strategy such as DFS could be used to exhaustively test </a:t>
+            </a:r>
+            <a:r>
+              <a:rPr lang="en-US" baseline="0" dirty="0" err="1" smtClean="0"/>
+              <a:t>MigratingTable</a:t>
+            </a:r>
+            <a:r>
+              <a:rPr lang="en-US" baseline="0" dirty="0" smtClean="0"/>
+              <a:t> up to some bound.</a:t>
+            </a:r>
+            <a:endParaRPr lang="en-US" dirty="0" smtClean="0"/>
+          </a:p>
+        </p:txBody>
+      </p:sp>
+      <p:sp>
+        <p:nvSpPr>
+          <p:cNvPr id="4" name="Slide Number Placeholder 3"/>
+          <p:cNvSpPr>
+            <a:spLocks noGrp="1"/>
+          </p:cNvSpPr>
+          <p:nvPr>
+            <p:ph type="sldNum" sz="quarter" idx="10"/>
+          </p:nvPr>
+        </p:nvSpPr>
+        <p:spPr/>
+        <p:txBody>
+          <a:bodyPr/>
+          <a:lstStyle/>
+          <a:p>
+            <a:fld id="{3460E17B-79A4-45BF-A7A3-AF8BBC691D17}" type="slidenum">
+              <a:rPr lang="en-US" smtClean="0"/>
+              <a:t>2</a:t>
+            </a:fld>
+            <a:endParaRPr lang="en-US"/>
+          </a:p>
+        </p:txBody>
+      </p:sp>
+    </p:spTree>
+    <p:extLst>
+      <p:ext uri="{BB962C8B-B14F-4D97-AF65-F5344CB8AC3E}">
+        <p14:creationId xmlns:p14="http://schemas.microsoft.com/office/powerpoint/2010/main" val="3875080523"/>
+      </p:ext>
+    </p:extLst>
+  </p:cSld>
+  <p:clrMapOvr>
+    <a:masterClrMapping/>
+  </p:clrMapOvr>
+</p:notes>
 </file>
 
 <file path=ppt/slideLayouts/slideLayout1.xml><?xml version="1.0" encoding="utf-8"?>
@@ -239,7 +904,7 @@
           <a:p>
             <a:fld id="{AFFD86BF-C1B8-40C5-A432-B35B17626459}" type="datetimeFigureOut">
               <a:rPr lang="en-US" smtClean="0"/>
-              <a:t>2015-08-19</a:t>
+              <a:t>2015-08-20</a:t>
             </a:fld>
             <a:endParaRPr lang="en-US"/>
           </a:p>
@@ -409,7 +1074,7 @@
           <a:p>
             <a:fld id="{AFFD86BF-C1B8-40C5-A432-B35B17626459}" type="datetimeFigureOut">
               <a:rPr lang="en-US" smtClean="0"/>
-              <a:t>2015-08-19</a:t>
+              <a:t>2015-08-20</a:t>
             </a:fld>
             <a:endParaRPr lang="en-US"/>
           </a:p>
@@ -589,7 +1254,7 @@
           <a:p>
             <a:fld id="{AFFD86BF-C1B8-40C5-A432-B35B17626459}" type="datetimeFigureOut">
               <a:rPr lang="en-US" smtClean="0"/>
-              <a:t>2015-08-19</a:t>
+              <a:t>2015-08-20</a:t>
             </a:fld>
             <a:endParaRPr lang="en-US"/>
           </a:p>
@@ -759,7 +1424,7 @@
           <a:p>
             <a:fld id="{AFFD86BF-C1B8-40C5-A432-B35B17626459}" type="datetimeFigureOut">
               <a:rPr lang="en-US" smtClean="0"/>
-              <a:t>2015-08-19</a:t>
+              <a:t>2015-08-20</a:t>
             </a:fld>
             <a:endParaRPr lang="en-US"/>
           </a:p>
@@ -1005,7 +1670,7 @@
           <a:p>
             <a:fld id="{AFFD86BF-C1B8-40C5-A432-B35B17626459}" type="datetimeFigureOut">
               <a:rPr lang="en-US" smtClean="0"/>
-              <a:t>2015-08-19</a:t>
+              <a:t>2015-08-20</a:t>
             </a:fld>
             <a:endParaRPr lang="en-US"/>
           </a:p>
@@ -1237,7 +1902,7 @@
           <a:p>
             <a:fld id="{AFFD86BF-C1B8-40C5-A432-B35B17626459}" type="datetimeFigureOut">
               <a:rPr lang="en-US" smtClean="0"/>
-              <a:t>2015-08-19</a:t>
+              <a:t>2015-08-20</a:t>
             </a:fld>
             <a:endParaRPr lang="en-US"/>
           </a:p>
@@ -1604,7 +2269,7 @@
           <a:p>
             <a:fld id="{AFFD86BF-C1B8-40C5-A432-B35B17626459}" type="datetimeFigureOut">
               <a:rPr lang="en-US" smtClean="0"/>
-              <a:t>2015-08-19</a:t>
+              <a:t>2015-08-20</a:t>
             </a:fld>
             <a:endParaRPr lang="en-US"/>
           </a:p>
@@ -1722,7 +2387,7 @@
           <a:p>
             <a:fld id="{AFFD86BF-C1B8-40C5-A432-B35B17626459}" type="datetimeFigureOut">
               <a:rPr lang="en-US" smtClean="0"/>
-              <a:t>2015-08-19</a:t>
+              <a:t>2015-08-20</a:t>
             </a:fld>
             <a:endParaRPr lang="en-US"/>
           </a:p>
@@ -1817,7 +2482,7 @@
           <a:p>
             <a:fld id="{AFFD86BF-C1B8-40C5-A432-B35B17626459}" type="datetimeFigureOut">
               <a:rPr lang="en-US" smtClean="0"/>
-              <a:t>2015-08-19</a:t>
+              <a:t>2015-08-20</a:t>
             </a:fld>
             <a:endParaRPr lang="en-US"/>
           </a:p>
@@ -2094,7 +2759,7 @@
           <a:p>
             <a:fld id="{AFFD86BF-C1B8-40C5-A432-B35B17626459}" type="datetimeFigureOut">
               <a:rPr lang="en-US" smtClean="0"/>
-              <a:t>2015-08-19</a:t>
+              <a:t>2015-08-20</a:t>
             </a:fld>
             <a:endParaRPr lang="en-US"/>
           </a:p>
@@ -2347,7 +3012,7 @@
           <a:p>
             <a:fld id="{AFFD86BF-C1B8-40C5-A432-B35B17626459}" type="datetimeFigureOut">
               <a:rPr lang="en-US" smtClean="0"/>
-              <a:t>2015-08-19</a:t>
+              <a:t>2015-08-20</a:t>
             </a:fld>
             <a:endParaRPr lang="en-US"/>
           </a:p>
@@ -2560,7 +3225,7 @@
           <a:p>
             <a:fld id="{AFFD86BF-C1B8-40C5-A432-B35B17626459}" type="datetimeFigureOut">
               <a:rPr lang="en-US" smtClean="0"/>
-              <a:t>2015-08-19</a:t>
+              <a:t>2015-08-20</a:t>
             </a:fld>
             <a:endParaRPr lang="en-US"/>
           </a:p>
@@ -4929,11 +5594,11 @@
   <p:clrMapOvr>
     <a:masterClrMapping/>
   </p:clrMapOvr>
-  <mc:AlternateContent xmlns:mc="http://schemas.openxmlformats.org/markup-compatibility/2006">
-    <mc:Choice xmlns:p14="http://schemas.microsoft.com/office/powerpoint/2010/main" Requires="p14">
+  <mc:AlternateContent xmlns:mc="http://schemas.openxmlformats.org/markup-compatibility/2006" xmlns:p14="http://schemas.microsoft.com/office/powerpoint/2010/main">
+    <mc:Choice Requires="p14">
       <p:transition spd="slow" p14:dur="2000"/>
     </mc:Choice>
-    <mc:Fallback>
+    <mc:Fallback xmlns="">
       <p:transition spd="slow"/>
     </mc:Fallback>
   </mc:AlternateContent>
@@ -5388,8 +6053,8 @@
         </p:nvSpPr>
         <p:spPr>
           <a:xfrm>
-            <a:off x="6429499" y="3990479"/>
-            <a:ext cx="2596644" cy="2379715"/>
+            <a:off x="4944798" y="4159428"/>
+            <a:ext cx="2931121" cy="2379715"/>
           </a:xfrm>
           <a:prstGeom prst="roundRect">
             <a:avLst/>
@@ -5436,8 +6101,8 @@
         </p:nvSpPr>
         <p:spPr>
           <a:xfrm>
-            <a:off x="6557258" y="3833972"/>
-            <a:ext cx="2596644" cy="2379715"/>
+            <a:off x="5124216" y="4002920"/>
+            <a:ext cx="2915045" cy="2379715"/>
           </a:xfrm>
           <a:prstGeom prst="roundRect">
             <a:avLst/>
@@ -5484,7 +6149,7 @@
         </p:nvSpPr>
         <p:spPr>
           <a:xfrm>
-            <a:off x="10578011" y="5298552"/>
+            <a:off x="9427788" y="5467501"/>
             <a:ext cx="699589" cy="457200"/>
           </a:xfrm>
           <a:prstGeom prst="rect">
@@ -5542,7 +6207,7 @@
         </p:nvSpPr>
         <p:spPr>
           <a:xfrm>
-            <a:off x="10578011" y="5746950"/>
+            <a:off x="9427788" y="5915899"/>
             <a:ext cx="699589" cy="457200"/>
           </a:xfrm>
           <a:prstGeom prst="rect">
@@ -5600,7 +6265,7 @@
         </p:nvSpPr>
         <p:spPr>
           <a:xfrm>
-            <a:off x="10578011" y="2461638"/>
+            <a:off x="9427788" y="2630587"/>
             <a:ext cx="699589" cy="457200"/>
           </a:xfrm>
           <a:prstGeom prst="rect">
@@ -5658,7 +6323,7 @@
         </p:nvSpPr>
         <p:spPr>
           <a:xfrm>
-            <a:off x="10578011" y="4332329"/>
+            <a:off x="9427788" y="4501278"/>
             <a:ext cx="699589" cy="457200"/>
           </a:xfrm>
           <a:prstGeom prst="rect">
@@ -5724,14 +6389,17 @@
           <a:lstStyle/>
           <a:p>
             <a:r>
-              <a:rPr lang="en-US" dirty="0" smtClean="0"/>
-              <a:t>Verification of </a:t>
-            </a:r>
-            <a:r>
-              <a:rPr lang="en-US" dirty="0" err="1" smtClean="0"/>
+              <a:rPr lang="en-US" dirty="0"/>
+              <a:t>Testing </a:t>
+            </a:r>
+            <a:r>
+              <a:rPr lang="en-US" dirty="0" err="1"/>
               <a:t>MigratingTable</a:t>
             </a:r>
-            <a:endParaRPr lang="en-US" dirty="0"/>
+            <a:r>
+              <a:rPr lang="en-US" dirty="0"/>
+              <a:t> with P#</a:t>
+            </a:r>
           </a:p>
         </p:txBody>
       </p:sp>
@@ -5748,135 +6416,35 @@
         <p:spPr>
           <a:xfrm>
             <a:off x="521208" y="1463040"/>
-            <a:ext cx="5670586" cy="4262705"/>
+            <a:ext cx="4239579" cy="4907154"/>
           </a:xfrm>
         </p:spPr>
         <p:txBody>
           <a:bodyPr>
-            <a:normAutofit lnSpcReduction="10000"/>
+            <a:normAutofit/>
           </a:bodyPr>
           <a:lstStyle/>
           <a:p>
-            <a:pPr marL="589788" lvl="1" indent="-571500">
-              <a:spcBef>
-                <a:spcPts val="600"/>
-              </a:spcBef>
-              <a:buFont typeface="Arial" panose="020B0604020202020204" pitchFamily="34" charset="0"/>
-              <a:buChar char="•"/>
-            </a:pPr>
+            <a:r>
+              <a:rPr lang="en-US" dirty="0" err="1"/>
+              <a:t>SpecTable</a:t>
+            </a:r>
+            <a:r>
+              <a:rPr lang="en-US" dirty="0"/>
+              <a:t>: in-memory reference implementation of IChainTable2</a:t>
+            </a:r>
+          </a:p>
+          <a:p>
+            <a:pPr lvl="1"/>
+            <a:r>
+              <a:rPr lang="en-US" dirty="0"/>
+              <a:t>Query stream read can return list of possibilities or use P# </a:t>
+            </a:r>
             <a:r>
               <a:rPr lang="en-US" dirty="0" smtClean="0"/>
-              <a:t>Want to verify: </a:t>
-            </a:r>
-            <a:r>
-              <a:rPr lang="en-US" dirty="0" err="1" smtClean="0"/>
-              <a:t>MigratingTable</a:t>
-            </a:r>
-            <a:r>
-              <a:rPr lang="en-US" dirty="0" smtClean="0"/>
-              <a:t> satisfies spec for a (single) table.</a:t>
-            </a:r>
-          </a:p>
-          <a:p>
-            <a:pPr marL="589788" lvl="1" indent="-571500">
-              <a:spcBef>
-                <a:spcPts val="600"/>
-              </a:spcBef>
-              <a:buFont typeface="Arial" panose="020B0604020202020204" pitchFamily="34" charset="0"/>
-              <a:buChar char="•"/>
-            </a:pPr>
-            <a:r>
-              <a:rPr lang="en-US" dirty="0" smtClean="0"/>
-              <a:t>Issue random sequence of reads &amp; writes to </a:t>
-            </a:r>
-            <a:r>
-              <a:rPr lang="en-US" dirty="0" err="1" smtClean="0"/>
-              <a:t>MigratingTable</a:t>
-            </a:r>
-            <a:r>
-              <a:rPr lang="en-US" dirty="0" smtClean="0"/>
-              <a:t> (in parallel w/ migration) and reference implementation.  Verify results equal.</a:t>
-            </a:r>
-          </a:p>
-          <a:p>
-            <a:pPr marL="589788" lvl="1" indent="-571500">
-              <a:spcBef>
-                <a:spcPts val="600"/>
-              </a:spcBef>
-              <a:buFont typeface="Arial" panose="020B0604020202020204" pitchFamily="34" charset="0"/>
-              <a:buChar char="•"/>
-            </a:pPr>
-            <a:r>
-              <a:rPr lang="en-US" dirty="0" smtClean="0"/>
-              <a:t>Interesting part: concurrency!</a:t>
-            </a:r>
-          </a:p>
-          <a:p>
-            <a:pPr marL="1097280" lvl="2" indent="-571500">
-              <a:spcBef>
-                <a:spcPts val="600"/>
-              </a:spcBef>
-            </a:pPr>
-            <a:r>
-              <a:rPr lang="en-US" sz="2000" dirty="0" smtClean="0">
-                <a:latin typeface="Segoe UI" panose="020B0502040204020203" pitchFamily="34" charset="0"/>
-                <a:cs typeface="Segoe UI" panose="020B0502040204020203" pitchFamily="34" charset="0"/>
-              </a:rPr>
-              <a:t>Model application VMs, Azure storage service as P# message-passing system</a:t>
-            </a:r>
-          </a:p>
-          <a:p>
-            <a:pPr marL="1097280" lvl="2" indent="-571500">
-              <a:spcBef>
-                <a:spcPts val="600"/>
-              </a:spcBef>
-            </a:pPr>
-            <a:r>
-              <a:rPr lang="en-US" sz="2000" dirty="0" smtClean="0">
-                <a:latin typeface="Segoe UI" panose="020B0502040204020203" pitchFamily="34" charset="0"/>
-                <a:cs typeface="Segoe UI" panose="020B0502040204020203" pitchFamily="34" charset="0"/>
-              </a:rPr>
-              <a:t>P# controls interleaving, randomly samples execution traces</a:t>
-            </a:r>
-          </a:p>
-          <a:p>
-            <a:pPr marL="1097280" lvl="2" indent="-571500">
-              <a:spcBef>
-                <a:spcPts val="600"/>
-              </a:spcBef>
-            </a:pPr>
-            <a:r>
-              <a:rPr lang="en-US" sz="2000" dirty="0" err="1" smtClean="0">
-                <a:latin typeface="Segoe UI" panose="020B0502040204020203" pitchFamily="34" charset="0"/>
-                <a:cs typeface="Segoe UI" panose="020B0502040204020203" pitchFamily="34" charset="0"/>
-              </a:rPr>
-              <a:t>MigratingTable</a:t>
-            </a:r>
-            <a:r>
-              <a:rPr lang="en-US" sz="2000" dirty="0" smtClean="0">
-                <a:latin typeface="Segoe UI" panose="020B0502040204020203" pitchFamily="34" charset="0"/>
-                <a:cs typeface="Segoe UI" panose="020B0502040204020203" pitchFamily="34" charset="0"/>
-              </a:rPr>
-              <a:t> reports </a:t>
-            </a:r>
-            <a:r>
-              <a:rPr lang="en-US" sz="2000" i="1" dirty="0" smtClean="0">
-                <a:latin typeface="Segoe UI" panose="020B0502040204020203" pitchFamily="34" charset="0"/>
-                <a:cs typeface="Segoe UI" panose="020B0502040204020203" pitchFamily="34" charset="0"/>
-              </a:rPr>
-              <a:t>linearization point</a:t>
-            </a:r>
-            <a:r>
-              <a:rPr lang="en-US" sz="2000" dirty="0" smtClean="0">
-                <a:latin typeface="Segoe UI" panose="020B0502040204020203" pitchFamily="34" charset="0"/>
-                <a:cs typeface="Segoe UI" panose="020B0502040204020203" pitchFamily="34" charset="0"/>
-              </a:rPr>
-              <a:t> when call should be applied to reference table</a:t>
-            </a:r>
-            <a:endParaRPr lang="en-US" sz="2000" dirty="0">
-              <a:latin typeface="Segoe UI" panose="020B0502040204020203" pitchFamily="34" charset="0"/>
-              <a:cs typeface="Segoe UI" panose="020B0502040204020203" pitchFamily="34" charset="0"/>
-            </a:endParaRPr>
+              <a:t>nondeterminism</a:t>
+            </a:r>
+            <a:endParaRPr lang="en-US" dirty="0"/>
           </a:p>
         </p:txBody>
       </p:sp>
@@ -5920,7 +6488,7 @@
         </p:nvSpPr>
         <p:spPr>
           <a:xfrm>
-            <a:off x="9921965" y="1971675"/>
+            <a:off x="8771742" y="2140624"/>
             <a:ext cx="2011680" cy="4521200"/>
           </a:xfrm>
           <a:prstGeom prst="roundRect">
@@ -5966,7 +6534,7 @@
         </p:nvSpPr>
         <p:spPr>
           <a:xfrm>
-            <a:off x="10578011" y="3876259"/>
+            <a:off x="9427788" y="4045208"/>
             <a:ext cx="699589" cy="914400"/>
           </a:xfrm>
           <a:prstGeom prst="rect">
@@ -6012,7 +6580,7 @@
         </p:nvSpPr>
         <p:spPr>
           <a:xfrm>
-            <a:off x="10578011" y="2461638"/>
+            <a:off x="9427788" y="2630587"/>
             <a:ext cx="699589" cy="914400"/>
           </a:xfrm>
           <a:prstGeom prst="rect">
@@ -6058,7 +6626,7 @@
         </p:nvSpPr>
         <p:spPr>
           <a:xfrm>
-            <a:off x="10578011" y="5290880"/>
+            <a:off x="9427788" y="5459829"/>
             <a:ext cx="699589" cy="914400"/>
           </a:xfrm>
           <a:prstGeom prst="rect">
@@ -6104,8 +6672,8 @@
         </p:nvSpPr>
         <p:spPr>
           <a:xfrm>
-            <a:off x="10408079" y="2092306"/>
-            <a:ext cx="1039452" cy="369332"/>
+            <a:off x="9027410" y="2261255"/>
+            <a:ext cx="1500347" cy="369332"/>
           </a:xfrm>
           <a:prstGeom prst="rect">
             <a:avLst/>
@@ -6121,7 +6689,11 @@
             <a:pPr algn="ctr"/>
             <a:r>
               <a:rPr lang="en-US" dirty="0" smtClean="0"/>
-              <a:t>Old table</a:t>
+              <a:t>Old </a:t>
+            </a:r>
+            <a:r>
+              <a:rPr lang="en-US" dirty="0" err="1" smtClean="0"/>
+              <a:t>SpecTable</a:t>
             </a:r>
             <a:endParaRPr lang="en-US" dirty="0"/>
           </a:p>
@@ -6135,8 +6707,8 @@
         </p:nvSpPr>
         <p:spPr>
           <a:xfrm>
-            <a:off x="10357360" y="3506927"/>
-            <a:ext cx="1140890" cy="369332"/>
+            <a:off x="8976690" y="3675876"/>
+            <a:ext cx="1601785" cy="369332"/>
           </a:xfrm>
           <a:prstGeom prst="rect">
             <a:avLst/>
@@ -6152,7 +6724,11 @@
             <a:pPr algn="ctr"/>
             <a:r>
               <a:rPr lang="en-US" dirty="0" smtClean="0"/>
-              <a:t>New table</a:t>
+              <a:t>New </a:t>
+            </a:r>
+            <a:r>
+              <a:rPr lang="en-US" dirty="0" err="1" smtClean="0"/>
+              <a:t>SpecTable</a:t>
             </a:r>
             <a:endParaRPr lang="en-US" dirty="0"/>
           </a:p>
@@ -6166,8 +6742,8 @@
         </p:nvSpPr>
         <p:spPr>
           <a:xfrm>
-            <a:off x="10100529" y="4920130"/>
-            <a:ext cx="1654557" cy="369332"/>
+            <a:off x="8719860" y="5089079"/>
+            <a:ext cx="2115451" cy="369332"/>
           </a:xfrm>
           <a:prstGeom prst="rect">
             <a:avLst/>
@@ -6183,7 +6759,11 @@
             <a:pPr algn="ctr"/>
             <a:r>
               <a:rPr lang="en-US" dirty="0" smtClean="0"/>
-              <a:t>Reference table</a:t>
+              <a:t>Reference </a:t>
+            </a:r>
+            <a:r>
+              <a:rPr lang="en-US" dirty="0" err="1" smtClean="0"/>
+              <a:t>SpecTable</a:t>
             </a:r>
             <a:endParaRPr lang="en-US" dirty="0"/>
           </a:p>
@@ -6197,8 +6777,8 @@
         </p:nvSpPr>
         <p:spPr>
           <a:xfrm>
-            <a:off x="6690083" y="3681582"/>
-            <a:ext cx="2596644" cy="2379715"/>
+            <a:off x="5361485" y="3850531"/>
+            <a:ext cx="2775019" cy="2379715"/>
           </a:xfrm>
           <a:prstGeom prst="roundRect">
             <a:avLst/>
@@ -6245,7 +6825,7 @@
         </p:nvSpPr>
         <p:spPr>
           <a:xfrm>
-            <a:off x="8136526" y="4180674"/>
+            <a:off x="6986303" y="4349623"/>
             <a:ext cx="699589" cy="914400"/>
           </a:xfrm>
           <a:prstGeom prst="rect">
@@ -6291,7 +6871,7 @@
         </p:nvSpPr>
         <p:spPr>
           <a:xfrm>
-            <a:off x="8047931" y="3814169"/>
+            <a:off x="6897708" y="3983118"/>
             <a:ext cx="876778" cy="369332"/>
           </a:xfrm>
           <a:prstGeom prst="rect">
@@ -6325,7 +6905,7 @@
         </p:nvCxnSpPr>
         <p:spPr>
           <a:xfrm flipV="1">
-            <a:off x="8836115" y="2918838"/>
+            <a:off x="7685892" y="3087787"/>
             <a:ext cx="1741896" cy="1719036"/>
           </a:xfrm>
           <a:prstGeom prst="straightConnector1">
@@ -6364,7 +6944,7 @@
         </p:nvCxnSpPr>
         <p:spPr>
           <a:xfrm flipV="1">
-            <a:off x="8836115" y="4333459"/>
+            <a:off x="7685892" y="4502408"/>
             <a:ext cx="1741896" cy="304415"/>
           </a:xfrm>
           <a:prstGeom prst="straightConnector1">
@@ -6400,8 +6980,8 @@
         </p:nvSpPr>
         <p:spPr>
           <a:xfrm>
-            <a:off x="6749427" y="5303199"/>
-            <a:ext cx="1016000" cy="646331"/>
+            <a:off x="5396025" y="5153028"/>
+            <a:ext cx="1309372" cy="1077218"/>
           </a:xfrm>
           <a:prstGeom prst="rect">
             <a:avLst/>
@@ -6416,10 +6996,10 @@
           <a:p>
             <a:pPr algn="ctr"/>
             <a:r>
-              <a:rPr lang="en-US" dirty="0" smtClean="0"/>
-              <a:t>Random R/W</a:t>
-            </a:r>
-            <a:endParaRPr lang="en-US" dirty="0"/>
+              <a:rPr lang="en-US" sz="1600" dirty="0" smtClean="0"/>
+              <a:t>P#-controlled random R/W, compare results</a:t>
+            </a:r>
+            <a:endParaRPr lang="en-US" sz="1600" dirty="0"/>
           </a:p>
         </p:txBody>
       </p:sp>
@@ -6427,15 +7007,14 @@
         <p:nvCxnSpPr>
           <p:cNvPr id="30" name="Straight Arrow Connector 29"/>
           <p:cNvCxnSpPr>
-            <a:stCxn id="28" idx="3"/>
             <a:endCxn id="20" idx="1"/>
           </p:cNvCxnSpPr>
           <p:nvPr/>
         </p:nvCxnSpPr>
         <p:spPr>
           <a:xfrm flipV="1">
-            <a:off x="7765427" y="4637874"/>
-            <a:ext cx="371099" cy="988491"/>
+            <a:off x="6639110" y="4806823"/>
+            <a:ext cx="347193" cy="1017859"/>
           </a:xfrm>
           <a:prstGeom prst="straightConnector1">
             <a:avLst/>
@@ -6465,15 +7044,13 @@
       <p:cxnSp>
         <p:nvCxnSpPr>
           <p:cNvPr id="32" name="Straight Arrow Connector 31"/>
-          <p:cNvCxnSpPr>
-            <a:stCxn id="28" idx="3"/>
-          </p:cNvCxnSpPr>
+          <p:cNvCxnSpPr/>
           <p:nvPr/>
         </p:nvCxnSpPr>
         <p:spPr>
           <a:xfrm>
-            <a:off x="7765427" y="5626365"/>
-            <a:ext cx="656046" cy="31968"/>
+            <a:off x="6615204" y="5817835"/>
+            <a:ext cx="689951" cy="29425"/>
           </a:xfrm>
           <a:prstGeom prst="straightConnector1">
             <a:avLst/>
@@ -6508,7 +7085,7 @@
         </p:nvSpPr>
         <p:spPr>
           <a:xfrm>
-            <a:off x="7037159" y="3288660"/>
+            <a:off x="5886936" y="3457609"/>
             <a:ext cx="1805815" cy="369332"/>
           </a:xfrm>
           <a:prstGeom prst="rect">
@@ -6538,7 +7115,7 @@
         </p:nvSpPr>
         <p:spPr>
           <a:xfrm>
-            <a:off x="10128102" y="1576300"/>
+            <a:off x="8977879" y="1745249"/>
             <a:ext cx="1626984" cy="369332"/>
           </a:xfrm>
           <a:prstGeom prst="rect">
@@ -6568,7 +7145,7 @@
         </p:nvSpPr>
         <p:spPr>
           <a:xfrm>
-            <a:off x="7524997" y="6165831"/>
+            <a:off x="6374774" y="6334780"/>
             <a:ext cx="433132" cy="523220"/>
           </a:xfrm>
           <a:prstGeom prst="rect">
@@ -6600,7 +7177,7 @@
         </p:nvCxnSpPr>
         <p:spPr>
           <a:xfrm>
-            <a:off x="8571780" y="5681745"/>
+            <a:off x="7421557" y="5850694"/>
             <a:ext cx="2006231" cy="66335"/>
           </a:xfrm>
           <a:prstGeom prst="straightConnector1">
@@ -6636,7 +7213,7 @@
         </p:nvCxnSpPr>
         <p:spPr>
           <a:xfrm>
-            <a:off x="8374231" y="5591521"/>
+            <a:off x="7224008" y="5760470"/>
             <a:ext cx="209414" cy="2729"/>
           </a:xfrm>
           <a:prstGeom prst="line">
@@ -6671,7 +7248,7 @@
         </p:nvCxnSpPr>
         <p:spPr>
           <a:xfrm flipV="1">
-            <a:off x="8490858" y="5023829"/>
+            <a:off x="7340635" y="5192778"/>
             <a:ext cx="0" cy="567694"/>
           </a:xfrm>
           <a:prstGeom prst="line">
@@ -6706,7 +7283,7 @@
         </p:nvSpPr>
         <p:spPr>
           <a:xfrm>
-            <a:off x="8611935" y="5153084"/>
+            <a:off x="7461712" y="5322033"/>
             <a:ext cx="1126018" cy="430887"/>
           </a:xfrm>
           <a:prstGeom prst="rect">
@@ -6741,7 +7318,7 @@
         </p:nvSpPr>
         <p:spPr>
           <a:xfrm>
-            <a:off x="6724623" y="1556407"/>
+            <a:off x="5574400" y="1725356"/>
             <a:ext cx="2596644" cy="1449997"/>
           </a:xfrm>
           <a:prstGeom prst="roundRect">
@@ -6789,7 +7366,7 @@
         </p:nvSpPr>
         <p:spPr>
           <a:xfrm>
-            <a:off x="8108304" y="1968848"/>
+            <a:off x="6958081" y="2137797"/>
             <a:ext cx="699589" cy="914400"/>
           </a:xfrm>
           <a:prstGeom prst="rect">
@@ -6835,7 +7412,7 @@
         </p:nvSpPr>
         <p:spPr>
           <a:xfrm>
-            <a:off x="7660766" y="1602343"/>
+            <a:off x="6510543" y="1771292"/>
             <a:ext cx="1594668" cy="369332"/>
           </a:xfrm>
           <a:prstGeom prst="rect">
@@ -6873,7 +7450,7 @@
         </p:nvCxnSpPr>
         <p:spPr>
           <a:xfrm>
-            <a:off x="8807893" y="2426048"/>
+            <a:off x="7657670" y="2594997"/>
             <a:ext cx="1770118" cy="492790"/>
           </a:xfrm>
           <a:prstGeom prst="straightConnector1">
@@ -6912,7 +7489,7 @@
         </p:nvCxnSpPr>
         <p:spPr>
           <a:xfrm>
-            <a:off x="8807893" y="2426048"/>
+            <a:off x="7657670" y="2594997"/>
             <a:ext cx="1770118" cy="1907411"/>
           </a:xfrm>
           <a:prstGeom prst="straightConnector1">
@@ -6948,7 +7525,7 @@
         </p:nvSpPr>
         <p:spPr>
           <a:xfrm>
-            <a:off x="7190542" y="1202907"/>
+            <a:off x="6040319" y="1371856"/>
             <a:ext cx="1861920" cy="369332"/>
           </a:xfrm>
           <a:prstGeom prst="rect">
@@ -6978,8 +7555,8 @@
         </p:nvSpPr>
         <p:spPr>
           <a:xfrm>
-            <a:off x="6701305" y="2243955"/>
-            <a:ext cx="1106650" cy="369332"/>
+            <a:off x="5551082" y="2412904"/>
+            <a:ext cx="1185196" cy="369332"/>
           </a:xfrm>
           <a:prstGeom prst="rect">
             <a:avLst/>
@@ -6994,7 +7571,7 @@
           <a:p>
             <a:r>
               <a:rPr lang="en-US" dirty="0" smtClean="0"/>
-              <a:t>“Migrate”</a:t>
+              <a:t>“Migrate!”</a:t>
             </a:r>
             <a:endParaRPr lang="en-US" dirty="0"/>
           </a:p>
@@ -7011,8 +7588,8 @@
         </p:nvCxnSpPr>
         <p:spPr>
           <a:xfrm flipV="1">
-            <a:off x="7807955" y="2426048"/>
-            <a:ext cx="300349" cy="2573"/>
+            <a:off x="6736278" y="2594997"/>
+            <a:ext cx="221803" cy="2573"/>
           </a:xfrm>
           <a:prstGeom prst="straightConnector1">
             <a:avLst/>
@@ -7042,7 +7619,7 @@
     </p:spTree>
     <p:extLst>
       <p:ext uri="{BB962C8B-B14F-4D97-AF65-F5344CB8AC3E}">
-        <p14:creationId xmlns:p14="http://schemas.microsoft.com/office/powerpoint/2010/main" val="2548164716"/>
+        <p14:creationId xmlns:p14="http://schemas.microsoft.com/office/powerpoint/2010/main" val="2032087762"/>
       </p:ext>
     </p:extLst>
   </p:cSld>
@@ -7326,4 +7903,265 @@
     </a:ext>
   </a:extLst>
 </a:theme>
+</file>
+
+<file path=ppt/theme/theme2.xml><?xml version="1.0" encoding="utf-8"?>
+<a:theme xmlns:a="http://schemas.openxmlformats.org/drawingml/2006/main" name="Office Theme">
+  <a:themeElements>
+    <a:clrScheme name="Office">
+      <a:dk1>
+        <a:sysClr val="windowText" lastClr="000000"/>
+      </a:dk1>
+      <a:lt1>
+        <a:sysClr val="window" lastClr="FFFFFF"/>
+      </a:lt1>
+      <a:dk2>
+        <a:srgbClr val="44546A"/>
+      </a:dk2>
+      <a:lt2>
+        <a:srgbClr val="E7E6E6"/>
+      </a:lt2>
+      <a:accent1>
+        <a:srgbClr val="5B9BD5"/>
+      </a:accent1>
+      <a:accent2>
+        <a:srgbClr val="ED7D31"/>
+      </a:accent2>
+      <a:accent3>
+        <a:srgbClr val="A5A5A5"/>
+      </a:accent3>
+      <a:accent4>
+        <a:srgbClr val="FFC000"/>
+      </a:accent4>
+      <a:accent5>
+        <a:srgbClr val="4472C4"/>
+      </a:accent5>
+      <a:accent6>
+        <a:srgbClr val="70AD47"/>
+      </a:accent6>
+      <a:hlink>
+        <a:srgbClr val="0563C1"/>
+      </a:hlink>
+      <a:folHlink>
+        <a:srgbClr val="954F72"/>
+      </a:folHlink>
+    </a:clrScheme>
+    <a:fontScheme name="Office">
+      <a:majorFont>
+        <a:latin typeface="Calibri Light" panose="020F0302020204030204"/>
+        <a:ea typeface=""/>
+        <a:cs typeface=""/>
+        <a:font script="Jpan" typeface="ＭＳ Ｐゴシック"/>
+        <a:font script="Hang" typeface="맑은 고딕"/>
+        <a:font script="Hans" typeface="宋体"/>
+        <a:font script="Hant" typeface="新細明體"/>
+        <a:font script="Arab" typeface="Times New Roman"/>
+        <a:font script="Hebr" typeface="Times New Roman"/>
+        <a:font script="Thai" typeface="Angsana New"/>
+        <a:font script="Ethi" typeface="Nyala"/>
+        <a:font script="Beng" typeface="Vrinda"/>
+        <a:font script="Gujr" typeface="Shruti"/>
+        <a:font script="Khmr" typeface="MoolBoran"/>
+        <a:font script="Knda" typeface="Tunga"/>
+        <a:font script="Guru" typeface="Raavi"/>
+        <a:font script="Cans" typeface="Euphemia"/>
+        <a:font script="Cher" typeface="Plantagenet Cherokee"/>
+        <a:font script="Yiii" typeface="Microsoft Yi Baiti"/>
+        <a:font script="Tibt" typeface="Microsoft Himalaya"/>
+        <a:font script="Thaa" typeface="MV Boli"/>
+        <a:font script="Deva" typeface="Mangal"/>
+        <a:font script="Telu" typeface="Gautami"/>
+        <a:font script="Taml" typeface="Latha"/>
+        <a:font script="Syrc" typeface="Estrangelo Edessa"/>
+        <a:font script="Orya" typeface="Kalinga"/>
+        <a:font script="Mlym" typeface="Kartika"/>
+        <a:font script="Laoo" typeface="DokChampa"/>
+        <a:font script="Sinh" typeface="Iskoola Pota"/>
+        <a:font script="Mong" typeface="Mongolian Baiti"/>
+        <a:font script="Viet" typeface="Times New Roman"/>
+        <a:font script="Uigh" typeface="Microsoft Uighur"/>
+        <a:font script="Geor" typeface="Sylfaen"/>
+      </a:majorFont>
+      <a:minorFont>
+        <a:latin typeface="Calibri" panose="020F0502020204030204"/>
+        <a:ea typeface=""/>
+        <a:cs typeface=""/>
+        <a:font script="Jpan" typeface="ＭＳ Ｐゴシック"/>
+        <a:font script="Hang" typeface="맑은 고딕"/>
+        <a:font script="Hans" typeface="宋体"/>
+        <a:font script="Hant" typeface="新細明體"/>
+        <a:font script="Arab" typeface="Arial"/>
+        <a:font script="Hebr" typeface="Arial"/>
+        <a:font script="Thai" typeface="Cordia New"/>
+        <a:font script="Ethi" typeface="Nyala"/>
+        <a:font script="Beng" typeface="Vrinda"/>
+        <a:font script="Gujr" typeface="Shruti"/>
+        <a:font script="Khmr" typeface="DaunPenh"/>
+        <a:font script="Knda" typeface="Tunga"/>
+        <a:font script="Guru" typeface="Raavi"/>
+        <a:font script="Cans" typeface="Euphemia"/>
+        <a:font script="Cher" typeface="Plantagenet Cherokee"/>
+        <a:font script="Yiii" typeface="Microsoft Yi Baiti"/>
+        <a:font script="Tibt" typeface="Microsoft Himalaya"/>
+        <a:font script="Thaa" typeface="MV Boli"/>
+        <a:font script="Deva" typeface="Mangal"/>
+        <a:font script="Telu" typeface="Gautami"/>
+        <a:font script="Taml" typeface="Latha"/>
+        <a:font script="Syrc" typeface="Estrangelo Edessa"/>
+        <a:font script="Orya" typeface="Kalinga"/>
+        <a:font script="Mlym" typeface="Kartika"/>
+        <a:font script="Laoo" typeface="DokChampa"/>
+        <a:font script="Sinh" typeface="Iskoola Pota"/>
+        <a:font script="Mong" typeface="Mongolian Baiti"/>
+        <a:font script="Viet" typeface="Arial"/>
+        <a:font script="Uigh" typeface="Microsoft Uighur"/>
+        <a:font script="Geor" typeface="Sylfaen"/>
+      </a:minorFont>
+    </a:fontScheme>
+    <a:fmtScheme name="Office">
+      <a:fillStyleLst>
+        <a:solidFill>
+          <a:schemeClr val="phClr"/>
+        </a:solidFill>
+        <a:gradFill rotWithShape="1">
+          <a:gsLst>
+            <a:gs pos="0">
+              <a:schemeClr val="phClr">
+                <a:lumMod val="110000"/>
+                <a:satMod val="105000"/>
+                <a:tint val="67000"/>
+              </a:schemeClr>
+            </a:gs>
+            <a:gs pos="50000">
+              <a:schemeClr val="phClr">
+                <a:lumMod val="105000"/>
+                <a:satMod val="103000"/>
+                <a:tint val="73000"/>
+              </a:schemeClr>
+            </a:gs>
+            <a:gs pos="100000">
+              <a:schemeClr val="phClr">
+                <a:lumMod val="105000"/>
+                <a:satMod val="109000"/>
+                <a:tint val="81000"/>
+              </a:schemeClr>
+            </a:gs>
+          </a:gsLst>
+          <a:lin ang="5400000" scaled="0"/>
+        </a:gradFill>
+        <a:gradFill rotWithShape="1">
+          <a:gsLst>
+            <a:gs pos="0">
+              <a:schemeClr val="phClr">
+                <a:satMod val="103000"/>
+                <a:lumMod val="102000"/>
+                <a:tint val="94000"/>
+              </a:schemeClr>
+            </a:gs>
+            <a:gs pos="50000">
+              <a:schemeClr val="phClr">
+                <a:satMod val="110000"/>
+                <a:lumMod val="100000"/>
+                <a:shade val="100000"/>
+              </a:schemeClr>
+            </a:gs>
+            <a:gs pos="100000">
+              <a:schemeClr val="phClr">
+                <a:lumMod val="99000"/>
+                <a:satMod val="120000"/>
+                <a:shade val="78000"/>
+              </a:schemeClr>
+            </a:gs>
+          </a:gsLst>
+          <a:lin ang="5400000" scaled="0"/>
+        </a:gradFill>
+      </a:fillStyleLst>
+      <a:lnStyleLst>
+        <a:ln w="6350" cap="flat" cmpd="sng" algn="ctr">
+          <a:solidFill>
+            <a:schemeClr val="phClr"/>
+          </a:solidFill>
+          <a:prstDash val="solid"/>
+          <a:miter lim="800000"/>
+        </a:ln>
+        <a:ln w="12700" cap="flat" cmpd="sng" algn="ctr">
+          <a:solidFill>
+            <a:schemeClr val="phClr"/>
+          </a:solidFill>
+          <a:prstDash val="solid"/>
+          <a:miter lim="800000"/>
+        </a:ln>
+        <a:ln w="19050" cap="flat" cmpd="sng" algn="ctr">
+          <a:solidFill>
+            <a:schemeClr val="phClr"/>
+          </a:solidFill>
+          <a:prstDash val="solid"/>
+          <a:miter lim="800000"/>
+        </a:ln>
+      </a:lnStyleLst>
+      <a:effectStyleLst>
+        <a:effectStyle>
+          <a:effectLst/>
+        </a:effectStyle>
+        <a:effectStyle>
+          <a:effectLst/>
+        </a:effectStyle>
+        <a:effectStyle>
+          <a:effectLst>
+            <a:outerShdw blurRad="57150" dist="19050" dir="5400000" algn="ctr" rotWithShape="0">
+              <a:srgbClr val="000000">
+                <a:alpha val="63000"/>
+              </a:srgbClr>
+            </a:outerShdw>
+          </a:effectLst>
+        </a:effectStyle>
+      </a:effectStyleLst>
+      <a:bgFillStyleLst>
+        <a:solidFill>
+          <a:schemeClr val="phClr"/>
+        </a:solidFill>
+        <a:solidFill>
+          <a:schemeClr val="phClr">
+            <a:tint val="95000"/>
+            <a:satMod val="170000"/>
+          </a:schemeClr>
+        </a:solidFill>
+        <a:gradFill rotWithShape="1">
+          <a:gsLst>
+            <a:gs pos="0">
+              <a:schemeClr val="phClr">
+                <a:tint val="93000"/>
+                <a:satMod val="150000"/>
+                <a:shade val="98000"/>
+                <a:lumMod val="102000"/>
+              </a:schemeClr>
+            </a:gs>
+            <a:gs pos="50000">
+              <a:schemeClr val="phClr">
+                <a:tint val="98000"/>
+                <a:satMod val="130000"/>
+                <a:shade val="90000"/>
+                <a:lumMod val="103000"/>
+              </a:schemeClr>
+            </a:gs>
+            <a:gs pos="100000">
+              <a:schemeClr val="phClr">
+                <a:shade val="63000"/>
+                <a:satMod val="120000"/>
+              </a:schemeClr>
+            </a:gs>
+          </a:gsLst>
+          <a:lin ang="5400000" scaled="0"/>
+        </a:gradFill>
+      </a:bgFillStyleLst>
+    </a:fmtScheme>
+  </a:themeElements>
+  <a:objectDefaults/>
+  <a:extraClrSchemeLst/>
+  <a:extLst>
+    <a:ext uri="{05A4C25C-085E-4340-85A3-A5531E510DB2}">
+      <thm15:themeFamily xmlns:thm15="http://schemas.microsoft.com/office/thememl/2012/main" name="Office Theme" id="{62F939B6-93AF-4DB8-9C6B-D6C7DFDC589F}" vid="{4A3C46E8-61CC-4603-A589-7422A47A8E4A}"/>
+    </a:ext>
+  </a:extLst>
+</a:theme>
 </file>
</xml_diff>